<commit_message>
feat: Delete unnecesary templates
</commit_message>
<xml_diff>
--- a/output.pptx
+++ b/output.pptx
@@ -9,7 +9,6 @@
   </p:notesMasterIdLst>
   <p:sldIdLst>
     <p:sldId id="294" r:id="rId2"/>
-    <p:sldId id="327" r:id="rId4"/>
     <p:sldId id="328" r:id="rId10"/>
     <p:sldId id="329" r:id="rId11"/>
     <p:sldId id="330" r:id="rId12"/>
@@ -587,7 +586,7 @@
     </p:spTree>
     <p:extLst>
       <p:ext uri="{BB962C8B-B14F-4D97-AF65-F5344CB8AC3E}">
-        <p14:creationId xmlns:p14="http://schemas.microsoft.com/office/powerpoint/2010/main" val="1202887332"/>
+        <p14:creationId xmlns:p14="http://schemas.microsoft.com/office/powerpoint/2010/main" val="2431139541"/>
       </p:ext>
     </p:extLst>
   </p:cSld>
@@ -10556,7 +10555,7 @@
         <p:spPr>
           <a:xfrm>
             <a:off x="352526" y="550203"/>
-            <a:ext cx="8360973" cy="800189"/>
+            <a:ext cx="8360973" cy="1262100"/>
           </a:xfrm>
           <a:prstGeom prst="rect">
             <a:avLst/>
@@ -10579,7 +10578,24 @@
                 <a:cs typeface="Calibri"/>
                 <a:sym typeface="Calibri"/>
               </a:rPr>
-              <a:t>Roadmap</a:t>
+              <a:t>#section_title</a:t>
+            </a:r>
+            <a:endParaRPr sz="4000">
+              <a:latin typeface="Calibri"/>
+              <a:ea typeface="Calibri"/>
+              <a:cs typeface="Calibri"/>
+              <a:sym typeface="Calibri"/>
+            </a:endParaRPr>
+          </a:p>
+          <a:p>
+            <a:r>
+              <a:rPr lang="es-ES" sz="3000">
+                <a:latin typeface="Calibri"/>
+                <a:ea typeface="Calibri"/>
+                <a:cs typeface="Calibri"/>
+                <a:sym typeface="Calibri"/>
+              </a:rPr>
+              <a:t>#section_subtitle</a:t>
             </a:r>
             <a:endParaRPr sz="3000">
               <a:latin typeface="Calibri"/>
@@ -10605,7 +10621,7 @@
         <p:spPr>
           <a:xfrm>
             <a:off x="-11490" y="6529100"/>
-            <a:ext cx="12202886" cy="343910"/>
+            <a:ext cx="11348500" cy="343910"/>
           </a:xfrm>
           <a:prstGeom prst="rect">
             <a:avLst/>
@@ -10646,6 +10662,58 @@
       </p:sp>
       <p:sp>
         <p:nvSpPr>
+          <p:cNvPr id="6" name="Elipse 5">
+            <a:extLst>
+              <a:ext uri="{FF2B5EF4-FFF2-40B4-BE49-F238E27FC236}">
+                <a16:creationId xmlns:a16="http://schemas.microsoft.com/office/drawing/2014/main" id="{A21EC5A5-23EA-60FD-46B7-7FAD7834D26E}"/>
+              </a:ext>
+            </a:extLst>
+          </p:cNvPr>
+          <p:cNvSpPr/>
+          <p:nvPr/>
+        </p:nvSpPr>
+        <p:spPr>
+          <a:xfrm>
+            <a:off x="10852690" y="5972624"/>
+            <a:ext cx="1413790" cy="1263153"/>
+          </a:xfrm>
+          <a:prstGeom prst="ellipse">
+            <a:avLst/>
+          </a:prstGeom>
+          <a:solidFill>
+            <a:srgbClr val="A80C30"/>
+          </a:solidFill>
+          <a:ln>
+            <a:noFill/>
+          </a:ln>
+        </p:spPr>
+        <p:style>
+          <a:lnRef idx="2">
+            <a:schemeClr val="accent1">
+              <a:shade val="50000"/>
+            </a:schemeClr>
+          </a:lnRef>
+          <a:fillRef idx="1">
+            <a:schemeClr val="accent1"/>
+          </a:fillRef>
+          <a:effectRef idx="0">
+            <a:schemeClr val="accent1"/>
+          </a:effectRef>
+          <a:fontRef idx="minor">
+            <a:schemeClr val="lt1"/>
+          </a:fontRef>
+        </p:style>
+        <p:txBody>
+          <a:bodyPr rtlCol="0" anchor="ctr"/>
+          <a:lstStyle/>
+          <a:p>
+            <a:pPr algn="ctr"/>
+            <a:endParaRPr lang="es-ES"/>
+          </a:p>
+        </p:txBody>
+      </p:sp>
+      <p:sp>
+        <p:nvSpPr>
           <p:cNvPr id="5" name="CuadroTexto 4">
             <a:extLst>
               <a:ext uri="{FF2B5EF4-FFF2-40B4-BE49-F238E27FC236}">
@@ -10688,10 +10756,10 @@
       </p:sp>
       <p:sp>
         <p:nvSpPr>
-          <p:cNvPr id="8" name="Google Shape;57;p8">
-            <a:extLst>
-              <a:ext uri="{FF2B5EF4-FFF2-40B4-BE49-F238E27FC236}">
-                <a16:creationId xmlns:a16="http://schemas.microsoft.com/office/drawing/2014/main" id="{A80284A9-9FAA-7144-39C9-5E8025C178D5}"/>
+          <p:cNvPr id="7" name="Google Shape;170;p17">
+            <a:extLst>
+              <a:ext uri="{FF2B5EF4-FFF2-40B4-BE49-F238E27FC236}">
+                <a16:creationId xmlns:a16="http://schemas.microsoft.com/office/drawing/2014/main" id="{27080597-2E99-61C9-2277-0BE143507FA1}"/>
               </a:ext>
             </a:extLst>
           </p:cNvPr>
@@ -10700,8 +10768,8 @@
         </p:nvSpPr>
         <p:spPr>
           <a:xfrm>
-            <a:off x="1055688" y="1420604"/>
-            <a:ext cx="8360973" cy="646300"/>
+            <a:off x="10927171" y="6263662"/>
+            <a:ext cx="1264829" cy="954077"/>
           </a:xfrm>
           <a:prstGeom prst="rect">
             <a:avLst/>
@@ -10717,22 +10785,35 @@
           </a:bodyPr>
           <a:lstStyle/>
           <a:p>
-            <a:r>
-              <a:rPr lang="es-ES" sz="3000">
+            <a:pPr algn="ctr"/>
+            <a:r>
+              <a:rPr lang="es-ES" sz="2500" b="1">
+                <a:solidFill>
+                  <a:srgbClr val="F3F3F3"/>
+                </a:solidFill>
                 <a:latin typeface="Calibri"/>
                 <a:ea typeface="Calibri"/>
                 <a:cs typeface="Calibri"/>
                 <a:sym typeface="Calibri"/>
               </a:rPr>
-              <a:t>#item_list</a:t>
-            </a:r>
+              <a:t>#slide_number</a:t>
+            </a:r>
+            <a:endParaRPr sz="2500" b="1">
+              <a:solidFill>
+                <a:srgbClr val="F3F3F3"/>
+              </a:solidFill>
+              <a:latin typeface="Calibri"/>
+              <a:ea typeface="Calibri"/>
+              <a:cs typeface="Calibri"/>
+              <a:sym typeface="Calibri"/>
+            </a:endParaRPr>
           </a:p>
         </p:txBody>
       </p:sp>
     </p:spTree>
     <p:extLst>
       <p:ext uri="{BB962C8B-B14F-4D97-AF65-F5344CB8AC3E}">
-        <p14:creationId xmlns:p14="http://schemas.microsoft.com/office/powerpoint/2010/main" val="2682430629"/>
+        <p14:creationId xmlns:p14="http://schemas.microsoft.com/office/powerpoint/2010/main" val="3994578730"/>
       </p:ext>
     </p:extLst>
   </p:cSld>

</xml_diff>